<commit_message>
Updates for BDD Testing Style
</commit_message>
<xml_diff>
--- a/Integration Test Course Outline.pptx
+++ b/Integration Test Course Outline.pptx
@@ -19,6 +19,9 @@
     <p:sldId id="275" r:id="rId17"/>
     <p:sldId id="276" r:id="rId18"/>
     <p:sldId id="277" r:id="rId19"/>
+    <p:sldId id="278" r:id="rId20"/>
+    <p:sldId id="279" r:id="rId21"/>
+    <p:sldId id="280" r:id="rId22"/>
   </p:sldIdLst>
   <p:sldSz cx="9144000" cy="6858000" type="screen4x3"/>
   <p:notesSz cx="6858000" cy="9144000"/>
@@ -37812,11 +37815,7 @@
             </a:pPr>
             <a:r>
               <a:rPr lang="en-US" dirty="0" smtClean="0"/>
-              <a:t>Download </a:t>
-            </a:r>
-            <a:r>
-              <a:rPr lang="en-US" dirty="0" smtClean="0"/>
-              <a:t>the Unit Test Code - </a:t>
+              <a:t>Download the Unit Test Code - </a:t>
             </a:r>
             <a:r>
               <a:rPr lang="en-US" dirty="0" smtClean="0">
@@ -37833,11 +37832,7 @@
             </a:pPr>
             <a:r>
               <a:rPr lang="en-US" dirty="0" smtClean="0"/>
-              <a:t>Ensure </a:t>
-            </a:r>
-            <a:r>
-              <a:rPr lang="en-US" dirty="0" smtClean="0"/>
-              <a:t>solution builds and you have all necessary Nuget Packages downloaded.</a:t>
+              <a:t>Ensure solution builds and you have all necessary Nuget Packages downloaded.</a:t>
             </a:r>
           </a:p>
           <a:p>
@@ -37903,6 +37898,423 @@
 </p:sld>
 </file>
 
+<file path=ppt/slides/slide10.xml><?xml version="1.0" encoding="utf-8"?>
+<p:sld xmlns:a="http://schemas.openxmlformats.org/drawingml/2006/main" xmlns:r="http://schemas.openxmlformats.org/officeDocument/2006/relationships" xmlns:p="http://schemas.openxmlformats.org/presentationml/2006/main">
+  <p:cSld>
+    <p:spTree>
+      <p:nvGrpSpPr>
+        <p:cNvPr id="1" name=""/>
+        <p:cNvGrpSpPr/>
+        <p:nvPr/>
+      </p:nvGrpSpPr>
+      <p:grpSpPr>
+        <a:xfrm>
+          <a:off x="0" y="0"/>
+          <a:ext cx="0" cy="0"/>
+          <a:chOff x="0" y="0"/>
+          <a:chExt cx="0" cy="0"/>
+        </a:xfrm>
+      </p:grpSpPr>
+      <p:sp>
+        <p:nvSpPr>
+          <p:cNvPr id="2" name="Title 1"/>
+          <p:cNvSpPr>
+            <a:spLocks noGrp="1"/>
+          </p:cNvSpPr>
+          <p:nvPr>
+            <p:ph type="ctrTitle"/>
+          </p:nvPr>
+        </p:nvSpPr>
+        <p:spPr/>
+        <p:txBody>
+          <a:bodyPr/>
+          <a:lstStyle/>
+          <a:p>
+            <a:r>
+              <a:rPr lang="en-US" dirty="0" smtClean="0"/>
+              <a:t>Post-Compiler (The Bonus Level)</a:t>
+            </a:r>
+            <a:endParaRPr lang="en-US" dirty="0"/>
+          </a:p>
+        </p:txBody>
+      </p:sp>
+      <p:sp>
+        <p:nvSpPr>
+          <p:cNvPr id="3" name="Content Placeholder 2"/>
+          <p:cNvSpPr>
+            <a:spLocks noGrp="1"/>
+          </p:cNvSpPr>
+          <p:nvPr>
+            <p:ph sz="quarter" idx="10"/>
+          </p:nvPr>
+        </p:nvSpPr>
+        <p:spPr/>
+        <p:txBody>
+          <a:bodyPr/>
+          <a:lstStyle/>
+          <a:p>
+            <a:r>
+              <a:rPr lang="en-US" dirty="0" smtClean="0"/>
+              <a:t>Review our unit test naming conventions.</a:t>
+            </a:r>
+          </a:p>
+          <a:p>
+            <a:pPr marL="285750" indent="-285750">
+              <a:buFont typeface="Arial" panose="020B0604020202020204" pitchFamily="34" charset="0"/>
+              <a:buChar char="•"/>
+            </a:pPr>
+            <a:r>
+              <a:rPr lang="en-US" dirty="0" smtClean="0"/>
+              <a:t>All unit tests should… Use common naming conventions.</a:t>
+            </a:r>
+          </a:p>
+          <a:p>
+            <a:r>
+              <a:rPr lang="en-US" dirty="0" smtClean="0"/>
+              <a:t>Have any of the examples thus far followed them?</a:t>
+            </a:r>
+          </a:p>
+          <a:p>
+            <a:endParaRPr lang="en-US" dirty="0"/>
+          </a:p>
+        </p:txBody>
+      </p:sp>
+      <p:sp>
+        <p:nvSpPr>
+          <p:cNvPr id="4" name="Text Placeholder 3"/>
+          <p:cNvSpPr>
+            <a:spLocks noGrp="1"/>
+          </p:cNvSpPr>
+          <p:nvPr>
+            <p:ph type="body" sz="quarter" idx="11"/>
+          </p:nvPr>
+        </p:nvSpPr>
+        <p:spPr/>
+        <p:txBody>
+          <a:bodyPr/>
+          <a:lstStyle/>
+          <a:p>
+            <a:endParaRPr lang="en-US"/>
+          </a:p>
+        </p:txBody>
+      </p:sp>
+    </p:spTree>
+    <p:extLst>
+      <p:ext uri="{BB962C8B-B14F-4D97-AF65-F5344CB8AC3E}">
+        <p14:creationId xmlns:p14="http://schemas.microsoft.com/office/powerpoint/2010/main" val="3993066761"/>
+      </p:ext>
+    </p:extLst>
+  </p:cSld>
+  <p:clrMapOvr>
+    <a:masterClrMapping/>
+  </p:clrMapOvr>
+  <mc:AlternateContent xmlns:mc="http://schemas.openxmlformats.org/markup-compatibility/2006">
+    <mc:Choice xmlns:p14="http://schemas.microsoft.com/office/powerpoint/2010/main" Requires="p14">
+      <p:transition spd="med" p14:dur="700">
+        <p:fade/>
+      </p:transition>
+    </mc:Choice>
+    <mc:Fallback>
+      <p:transition spd="med">
+        <p:fade/>
+      </p:transition>
+    </mc:Fallback>
+  </mc:AlternateContent>
+</p:sld>
+</file>
+
+<file path=ppt/slides/slide11.xml><?xml version="1.0" encoding="utf-8"?>
+<p:sld xmlns:a="http://schemas.openxmlformats.org/drawingml/2006/main" xmlns:r="http://schemas.openxmlformats.org/officeDocument/2006/relationships" xmlns:p="http://schemas.openxmlformats.org/presentationml/2006/main">
+  <p:cSld>
+    <p:spTree>
+      <p:nvGrpSpPr>
+        <p:cNvPr id="1" name=""/>
+        <p:cNvGrpSpPr/>
+        <p:nvPr/>
+      </p:nvGrpSpPr>
+      <p:grpSpPr>
+        <a:xfrm>
+          <a:off x="0" y="0"/>
+          <a:ext cx="0" cy="0"/>
+          <a:chOff x="0" y="0"/>
+          <a:chExt cx="0" cy="0"/>
+        </a:xfrm>
+      </p:grpSpPr>
+      <p:sp>
+        <p:nvSpPr>
+          <p:cNvPr id="2" name="Title 1"/>
+          <p:cNvSpPr>
+            <a:spLocks noGrp="1"/>
+          </p:cNvSpPr>
+          <p:nvPr>
+            <p:ph type="ctrTitle"/>
+          </p:nvPr>
+        </p:nvSpPr>
+        <p:spPr/>
+        <p:txBody>
+          <a:bodyPr/>
+          <a:lstStyle/>
+          <a:p>
+            <a:r>
+              <a:rPr lang="en-US" dirty="0" smtClean="0"/>
+              <a:t>What does a BDD look like?</a:t>
+            </a:r>
+            <a:endParaRPr lang="en-US" dirty="0"/>
+          </a:p>
+        </p:txBody>
+      </p:sp>
+      <p:sp>
+        <p:nvSpPr>
+          <p:cNvPr id="3" name="Content Placeholder 2"/>
+          <p:cNvSpPr>
+            <a:spLocks noGrp="1"/>
+          </p:cNvSpPr>
+          <p:nvPr>
+            <p:ph sz="quarter" idx="10"/>
+          </p:nvPr>
+        </p:nvSpPr>
+        <p:spPr/>
+        <p:txBody>
+          <a:bodyPr/>
+          <a:lstStyle/>
+          <a:p>
+            <a:r>
+              <a:rPr lang="en-US" dirty="0" smtClean="0"/>
+              <a:t>Review and run </a:t>
+            </a:r>
+          </a:p>
+          <a:p>
+            <a:r>
+              <a:rPr lang="en-US" dirty="0" err="1" smtClean="0"/>
+              <a:t>UnitTestWorkshop</a:t>
+            </a:r>
+            <a:endParaRPr lang="en-US" dirty="0" smtClean="0"/>
+          </a:p>
+          <a:p>
+            <a:r>
+              <a:rPr lang="en-US" dirty="0"/>
+              <a:t>	</a:t>
+            </a:r>
+            <a:r>
+              <a:rPr lang="en-US" dirty="0" smtClean="0"/>
+              <a:t>.Business</a:t>
+            </a:r>
+          </a:p>
+          <a:p>
+            <a:r>
+              <a:rPr lang="en-US" dirty="0"/>
+              <a:t>	</a:t>
+            </a:r>
+            <a:r>
+              <a:rPr lang="en-US" dirty="0" smtClean="0"/>
+              <a:t>.</a:t>
+            </a:r>
+            <a:r>
+              <a:rPr lang="en-US" dirty="0" err="1" smtClean="0"/>
+              <a:t>IntegrationTests</a:t>
+            </a:r>
+            <a:endParaRPr lang="en-US" dirty="0" smtClean="0"/>
+          </a:p>
+          <a:p>
+            <a:r>
+              <a:rPr lang="en-US" dirty="0"/>
+              <a:t>	</a:t>
+            </a:r>
+            <a:r>
+              <a:rPr lang="en-US" dirty="0" smtClean="0"/>
+              <a:t>.Providers</a:t>
+            </a:r>
+          </a:p>
+          <a:p>
+            <a:r>
+              <a:rPr lang="en-US" dirty="0"/>
+              <a:t>	</a:t>
+            </a:r>
+            <a:r>
+              <a:rPr lang="en-US" dirty="0" smtClean="0"/>
+              <a:t>.</a:t>
+            </a:r>
+            <a:r>
+              <a:rPr lang="en-US" dirty="0" err="1" smtClean="0"/>
+              <a:t>Advanced_UserAccountProvider_tests.cs</a:t>
+            </a:r>
+            <a:endParaRPr lang="en-US" dirty="0" smtClean="0"/>
+          </a:p>
+          <a:p>
+            <a:endParaRPr lang="en-US" dirty="0"/>
+          </a:p>
+          <a:p>
+            <a:r>
+              <a:rPr lang="en-US" dirty="0" smtClean="0"/>
+              <a:t>Group Code Review and Discussion</a:t>
+            </a:r>
+            <a:endParaRPr lang="en-US" dirty="0"/>
+          </a:p>
+        </p:txBody>
+      </p:sp>
+      <p:sp>
+        <p:nvSpPr>
+          <p:cNvPr id="4" name="Text Placeholder 3"/>
+          <p:cNvSpPr>
+            <a:spLocks noGrp="1"/>
+          </p:cNvSpPr>
+          <p:nvPr>
+            <p:ph type="body" sz="quarter" idx="11"/>
+          </p:nvPr>
+        </p:nvSpPr>
+        <p:spPr/>
+        <p:txBody>
+          <a:bodyPr/>
+          <a:lstStyle/>
+          <a:p>
+            <a:endParaRPr lang="en-US"/>
+          </a:p>
+        </p:txBody>
+      </p:sp>
+    </p:spTree>
+    <p:extLst>
+      <p:ext uri="{BB962C8B-B14F-4D97-AF65-F5344CB8AC3E}">
+        <p14:creationId xmlns:p14="http://schemas.microsoft.com/office/powerpoint/2010/main" val="3259582582"/>
+      </p:ext>
+    </p:extLst>
+  </p:cSld>
+  <p:clrMapOvr>
+    <a:masterClrMapping/>
+  </p:clrMapOvr>
+  <mc:AlternateContent xmlns:mc="http://schemas.openxmlformats.org/markup-compatibility/2006">
+    <mc:Choice xmlns:p14="http://schemas.microsoft.com/office/powerpoint/2010/main" Requires="p14">
+      <p:transition spd="med" p14:dur="700">
+        <p:fade/>
+      </p:transition>
+    </mc:Choice>
+    <mc:Fallback>
+      <p:transition spd="med">
+        <p:fade/>
+      </p:transition>
+    </mc:Fallback>
+  </mc:AlternateContent>
+</p:sld>
+</file>
+
+<file path=ppt/slides/slide12.xml><?xml version="1.0" encoding="utf-8"?>
+<p:sld xmlns:a="http://schemas.openxmlformats.org/drawingml/2006/main" xmlns:r="http://schemas.openxmlformats.org/officeDocument/2006/relationships" xmlns:p="http://schemas.openxmlformats.org/presentationml/2006/main">
+  <p:cSld>
+    <p:spTree>
+      <p:nvGrpSpPr>
+        <p:cNvPr id="1" name=""/>
+        <p:cNvGrpSpPr/>
+        <p:nvPr/>
+      </p:nvGrpSpPr>
+      <p:grpSpPr>
+        <a:xfrm>
+          <a:off x="0" y="0"/>
+          <a:ext cx="0" cy="0"/>
+          <a:chOff x="0" y="0"/>
+          <a:chExt cx="0" cy="0"/>
+        </a:xfrm>
+      </p:grpSpPr>
+      <p:sp>
+        <p:nvSpPr>
+          <p:cNvPr id="2" name="Title 1"/>
+          <p:cNvSpPr>
+            <a:spLocks noGrp="1"/>
+          </p:cNvSpPr>
+          <p:nvPr>
+            <p:ph type="ctrTitle"/>
+          </p:nvPr>
+        </p:nvSpPr>
+        <p:spPr/>
+        <p:txBody>
+          <a:bodyPr/>
+          <a:lstStyle/>
+          <a:p>
+            <a:r>
+              <a:rPr lang="en-US" dirty="0" smtClean="0"/>
+              <a:t>Convert your Delete Account Test</a:t>
+            </a:r>
+            <a:endParaRPr lang="en-US" dirty="0"/>
+          </a:p>
+        </p:txBody>
+      </p:sp>
+      <p:sp>
+        <p:nvSpPr>
+          <p:cNvPr id="3" name="Content Placeholder 2"/>
+          <p:cNvSpPr>
+            <a:spLocks noGrp="1"/>
+          </p:cNvSpPr>
+          <p:nvPr>
+            <p:ph sz="quarter" idx="10"/>
+          </p:nvPr>
+        </p:nvSpPr>
+        <p:spPr/>
+        <p:txBody>
+          <a:bodyPr/>
+          <a:lstStyle/>
+          <a:p>
+            <a:r>
+              <a:rPr lang="en-US" dirty="0" smtClean="0"/>
+              <a:t>Take the Delete Account Non Data Integration Test you wrote and convert it </a:t>
+            </a:r>
+            <a:r>
+              <a:rPr lang="en-US" smtClean="0"/>
+              <a:t>to the </a:t>
+            </a:r>
+            <a:r>
+              <a:rPr lang="en-US" dirty="0" smtClean="0"/>
+              <a:t>BDD </a:t>
+            </a:r>
+            <a:r>
+              <a:rPr lang="en-US" smtClean="0"/>
+              <a:t>Test Style.</a:t>
+            </a:r>
+            <a:endParaRPr lang="en-US" dirty="0"/>
+          </a:p>
+        </p:txBody>
+      </p:sp>
+      <p:sp>
+        <p:nvSpPr>
+          <p:cNvPr id="4" name="Text Placeholder 3"/>
+          <p:cNvSpPr>
+            <a:spLocks noGrp="1"/>
+          </p:cNvSpPr>
+          <p:nvPr>
+            <p:ph type="body" sz="quarter" idx="11"/>
+          </p:nvPr>
+        </p:nvSpPr>
+        <p:spPr/>
+        <p:txBody>
+          <a:bodyPr/>
+          <a:lstStyle/>
+          <a:p>
+            <a:endParaRPr lang="en-US"/>
+          </a:p>
+        </p:txBody>
+      </p:sp>
+    </p:spTree>
+    <p:extLst>
+      <p:ext uri="{BB962C8B-B14F-4D97-AF65-F5344CB8AC3E}">
+        <p14:creationId xmlns:p14="http://schemas.microsoft.com/office/powerpoint/2010/main" val="1427663308"/>
+      </p:ext>
+    </p:extLst>
+  </p:cSld>
+  <p:clrMapOvr>
+    <a:masterClrMapping/>
+  </p:clrMapOvr>
+  <mc:AlternateContent xmlns:mc="http://schemas.openxmlformats.org/markup-compatibility/2006">
+    <mc:Choice xmlns:p14="http://schemas.microsoft.com/office/powerpoint/2010/main" Requires="p14">
+      <p:transition spd="med" p14:dur="700">
+        <p:fade/>
+      </p:transition>
+    </mc:Choice>
+    <mc:Fallback>
+      <p:transition spd="med">
+        <p:fade/>
+      </p:transition>
+    </mc:Fallback>
+  </mc:AlternateContent>
+</p:sld>
+</file>
+
 <file path=ppt/slides/slide2.xml><?xml version="1.0" encoding="utf-8"?>
 <p:sld xmlns:a="http://schemas.openxmlformats.org/drawingml/2006/main" xmlns:r="http://schemas.openxmlformats.org/officeDocument/2006/relationships" xmlns:p="http://schemas.openxmlformats.org/presentationml/2006/main">
   <p:cSld>
@@ -37937,15 +38349,7 @@
           <a:p>
             <a:r>
               <a:rPr lang="en-US" dirty="0" smtClean="0"/>
-              <a:t>Integration</a:t>
-            </a:r>
-            <a:r>
-              <a:rPr lang="en-US" dirty="0" smtClean="0"/>
-              <a:t> </a:t>
-            </a:r>
-            <a:r>
-              <a:rPr lang="en-US" dirty="0" smtClean="0"/>
-              <a:t>Testing Workshop</a:t>
+              <a:t>Integration Testing Workshop</a:t>
             </a:r>
             <a:endParaRPr lang="en-US" dirty="0"/>
           </a:p>
@@ -38237,7 +38641,6 @@
               <a:rPr lang="en-US" dirty="0" smtClean="0"/>
               <a:t>As a class review two Integration Tests</a:t>
             </a:r>
-            <a:endParaRPr lang="en-US" dirty="0" smtClean="0"/>
           </a:p>
           <a:p>
             <a:pPr marL="457200" indent="-457200">
@@ -38271,7 +38674,6 @@
               <a:rPr lang="en-US" dirty="0" smtClean="0"/>
               <a:t>Group Code Review</a:t>
             </a:r>
-            <a:endParaRPr lang="en-US" dirty="0" smtClean="0"/>
           </a:p>
           <a:p>
             <a:pPr marL="457200" indent="-457200">
@@ -38280,13 +38682,8 @@
             </a:pPr>
             <a:r>
               <a:rPr lang="en-US" dirty="0" smtClean="0"/>
-              <a:t>Write Data Integration Test </a:t>
-            </a:r>
-            <a:r>
-              <a:rPr lang="en-US" dirty="0" smtClean="0"/>
-              <a:t>on User Authentication Repository</a:t>
-            </a:r>
-            <a:endParaRPr lang="en-US" dirty="0" smtClean="0"/>
+              <a:t>Write Data Integration Test on User Authentication Repository</a:t>
+            </a:r>
           </a:p>
           <a:p>
             <a:pPr marL="457200" indent="-457200">
@@ -38307,7 +38704,6 @@
               <a:rPr lang="en-US" dirty="0" smtClean="0"/>
               <a:t>Course Discussion</a:t>
             </a:r>
-            <a:endParaRPr lang="en-US" dirty="0" smtClean="0"/>
           </a:p>
         </p:txBody>
       </p:sp>
@@ -38476,13 +38872,13 @@
   <p:clrMapOvr>
     <a:masterClrMapping/>
   </p:clrMapOvr>
-  <mc:AlternateContent xmlns:mc="http://schemas.openxmlformats.org/markup-compatibility/2006">
-    <mc:Choice xmlns:p14="http://schemas.microsoft.com/office/powerpoint/2010/main" Requires="p14">
+  <mc:AlternateContent xmlns:mc="http://schemas.openxmlformats.org/markup-compatibility/2006" xmlns:p14="http://schemas.microsoft.com/office/powerpoint/2010/main">
+    <mc:Choice Requires="p14">
       <p:transition spd="med" p14:dur="700">
         <p:fade/>
       </p:transition>
     </mc:Choice>
-    <mc:Fallback>
+    <mc:Fallback xmlns="">
       <p:transition spd="med">
         <p:fade/>
       </p:transition>
@@ -38666,13 +39062,13 @@
   <p:clrMapOvr>
     <a:masterClrMapping/>
   </p:clrMapOvr>
-  <mc:AlternateContent xmlns:mc="http://schemas.openxmlformats.org/markup-compatibility/2006">
-    <mc:Choice xmlns:p14="http://schemas.microsoft.com/office/powerpoint/2010/main" Requires="p14">
+  <mc:AlternateContent xmlns:mc="http://schemas.openxmlformats.org/markup-compatibility/2006" xmlns:p14="http://schemas.microsoft.com/office/powerpoint/2010/main">
+    <mc:Choice Requires="p14">
       <p:transition spd="med" p14:dur="700">
         <p:fade/>
       </p:transition>
     </mc:Choice>
-    <mc:Fallback>
+    <mc:Fallback xmlns="">
       <p:transition spd="med">
         <p:fade/>
       </p:transition>
@@ -38844,13 +39240,13 @@
   <p:clrMapOvr>
     <a:masterClrMapping/>
   </p:clrMapOvr>
-  <mc:AlternateContent xmlns:mc="http://schemas.openxmlformats.org/markup-compatibility/2006">
-    <mc:Choice xmlns:p14="http://schemas.microsoft.com/office/powerpoint/2010/main" Requires="p14">
+  <mc:AlternateContent xmlns:mc="http://schemas.openxmlformats.org/markup-compatibility/2006" xmlns:p14="http://schemas.microsoft.com/office/powerpoint/2010/main">
+    <mc:Choice Requires="p14">
       <p:transition spd="med" p14:dur="700">
         <p:fade/>
       </p:transition>
     </mc:Choice>
-    <mc:Fallback>
+    <mc:Fallback xmlns="">
       <p:transition spd="med">
         <p:fade/>
       </p:transition>
@@ -38980,13 +39376,13 @@
   <p:clrMapOvr>
     <a:masterClrMapping/>
   </p:clrMapOvr>
-  <mc:AlternateContent xmlns:mc="http://schemas.openxmlformats.org/markup-compatibility/2006">
-    <mc:Choice xmlns:p14="http://schemas.microsoft.com/office/powerpoint/2010/main" Requires="p14">
+  <mc:AlternateContent xmlns:mc="http://schemas.openxmlformats.org/markup-compatibility/2006" xmlns:p14="http://schemas.microsoft.com/office/powerpoint/2010/main">
+    <mc:Choice Requires="p14">
       <p:transition spd="med" p14:dur="700">
         <p:fade/>
       </p:transition>
     </mc:Choice>
-    <mc:Fallback>
+    <mc:Fallback xmlns="">
       <p:transition spd="med">
         <p:fade/>
       </p:transition>
@@ -39091,13 +39487,13 @@
   <p:clrMapOvr>
     <a:masterClrMapping/>
   </p:clrMapOvr>
-  <mc:AlternateContent xmlns:mc="http://schemas.openxmlformats.org/markup-compatibility/2006">
-    <mc:Choice xmlns:p14="http://schemas.microsoft.com/office/powerpoint/2010/main" Requires="p14">
+  <mc:AlternateContent xmlns:mc="http://schemas.openxmlformats.org/markup-compatibility/2006" xmlns:p14="http://schemas.microsoft.com/office/powerpoint/2010/main">
+    <mc:Choice Requires="p14">
       <p:transition spd="med" p14:dur="700">
         <p:fade/>
       </p:transition>
     </mc:Choice>
-    <mc:Fallback>
+    <mc:Fallback xmlns="">
       <p:transition spd="med">
         <p:fade/>
       </p:transition>
@@ -40313,27 +40709,6 @@
 </file>
 
 <file path=customXml/item1.xml><?xml version="1.0" encoding="utf-8"?>
-<p:properties xmlns:p="http://schemas.microsoft.com/office/2006/metadata/properties" xmlns:xsi="http://www.w3.org/2001/XMLSchema-instance" xmlns:pc="http://schemas.microsoft.com/office/infopath/2007/PartnerControls">
-  <documentManagement>
-    <_dlc_DocId xmlns="fed61328-d0c3-4d79-b5dd-5b1944323ceb">VHQ46PVRA5Y3-365-14</_dlc_DocId>
-    <_dlc_DocIdUrl xmlns="fed61328-d0c3-4d79-b5dd-5b1944323ceb">
-      <Url>http://smg/marketing/_layouts/DocIdRedir.aspx?ID=VHQ46PVRA5Y3-365-14</Url>
-      <Description>VHQ46PVRA5Y3-365-14</Description>
-    </_dlc_DocIdUrl>
-  </documentManagement>
-</p:properties>
-</file>
-
-<file path=customXml/item2.xml><?xml version="1.0" encoding="utf-8"?>
-<?mso-contentType ?>
-<FormTemplates xmlns="http://schemas.microsoft.com/sharepoint/v3/contenttype/forms">
-  <Display>DocumentLibraryForm</Display>
-  <Edit>DocumentLibraryForm</Edit>
-  <New>DocumentLibraryForm</New>
-</FormTemplates>
-</file>
-
-<file path=customXml/item3.xml><?xml version="1.0" encoding="utf-8"?>
 <ct:contentTypeSchema xmlns:ct="http://schemas.microsoft.com/office/2006/metadata/contentType" xmlns:ma="http://schemas.microsoft.com/office/2006/metadata/properties/metaAttributes" ct:_="" ma:_="" ma:contentTypeName="Document" ma:contentTypeID="0x01010065DB69F4B9931A41BD1CB1C907AAA49F" ma:contentTypeVersion="0" ma:contentTypeDescription="Create a new document." ma:contentTypeScope="" ma:versionID="ae63ef20b08a1a11e69d96fba4c31982">
   <xsd:schema xmlns:xsd="http://www.w3.org/2001/XMLSchema" xmlns:xs="http://www.w3.org/2001/XMLSchema" xmlns:p="http://schemas.microsoft.com/office/2006/metadata/properties" xmlns:ns2="fed61328-d0c3-4d79-b5dd-5b1944323ceb" targetNamespace="http://schemas.microsoft.com/office/2006/metadata/properties" ma:root="true" ma:fieldsID="1fc386f82f808760f16c258f4870bc37" ns2:_="">
     <xsd:import namespace="fed61328-d0c3-4d79-b5dd-5b1944323ceb"/>
@@ -40478,6 +40853,27 @@
 </ct:contentTypeSchema>
 </file>
 
+<file path=customXml/item2.xml><?xml version="1.0" encoding="utf-8"?>
+<?mso-contentType ?>
+<FormTemplates xmlns="http://schemas.microsoft.com/sharepoint/v3/contenttype/forms">
+  <Display>DocumentLibraryForm</Display>
+  <Edit>DocumentLibraryForm</Edit>
+  <New>DocumentLibraryForm</New>
+</FormTemplates>
+</file>
+
+<file path=customXml/item3.xml><?xml version="1.0" encoding="utf-8"?>
+<p:properties xmlns:p="http://schemas.microsoft.com/office/2006/metadata/properties" xmlns:xsi="http://www.w3.org/2001/XMLSchema-instance" xmlns:pc="http://schemas.microsoft.com/office/infopath/2007/PartnerControls">
+  <documentManagement>
+    <_dlc_DocId xmlns="fed61328-d0c3-4d79-b5dd-5b1944323ceb">VHQ46PVRA5Y3-365-14</_dlc_DocId>
+    <_dlc_DocIdUrl xmlns="fed61328-d0c3-4d79-b5dd-5b1944323ceb">
+      <Url>http://smg/marketing/_layouts/DocIdRedir.aspx?ID=VHQ46PVRA5Y3-365-14</Url>
+      <Description>VHQ46PVRA5Y3-365-14</Description>
+    </_dlc_DocIdUrl>
+  </documentManagement>
+</p:properties>
+</file>
+
 <file path=customXml/item4.xml><?xml version="1.0" encoding="utf-8"?>
 <?mso-contentType ?>
 <spe:Receivers xmlns:spe="http://schemas.microsoft.com/sharepoint/events">
@@ -40525,30 +40921,6 @@
 </file>
 
 <file path=customXml/itemProps1.xml><?xml version="1.0" encoding="utf-8"?>
-<ds:datastoreItem xmlns:ds="http://schemas.openxmlformats.org/officeDocument/2006/customXml" ds:itemID="{A9BC35ED-4834-4120-9B6C-94C253E3F331}">
-  <ds:schemaRefs>
-    <ds:schemaRef ds:uri="fed61328-d0c3-4d79-b5dd-5b1944323ceb"/>
-    <ds:schemaRef ds:uri="http://schemas.microsoft.com/office/2006/documentManagement/types"/>
-    <ds:schemaRef ds:uri="http://purl.org/dc/elements/1.1/"/>
-    <ds:schemaRef ds:uri="http://purl.org/dc/terms/"/>
-    <ds:schemaRef ds:uri="http://purl.org/dc/dcmitype/"/>
-    <ds:schemaRef ds:uri="http://schemas.microsoft.com/office/infopath/2007/PartnerControls"/>
-    <ds:schemaRef ds:uri="http://schemas.openxmlformats.org/package/2006/metadata/core-properties"/>
-    <ds:schemaRef ds:uri="http://schemas.microsoft.com/office/2006/metadata/properties"/>
-    <ds:schemaRef ds:uri="http://www.w3.org/XML/1998/namespace"/>
-  </ds:schemaRefs>
-</ds:datastoreItem>
-</file>
-
-<file path=customXml/itemProps2.xml><?xml version="1.0" encoding="utf-8"?>
-<ds:datastoreItem xmlns:ds="http://schemas.openxmlformats.org/officeDocument/2006/customXml" ds:itemID="{4EA99AB7-52EE-4481-83AE-126E216AE03B}">
-  <ds:schemaRefs>
-    <ds:schemaRef ds:uri="http://schemas.microsoft.com/sharepoint/v3/contenttype/forms"/>
-  </ds:schemaRefs>
-</ds:datastoreItem>
-</file>
-
-<file path=customXml/itemProps3.xml><?xml version="1.0" encoding="utf-8"?>
 <ds:datastoreItem xmlns:ds="http://schemas.openxmlformats.org/officeDocument/2006/customXml" ds:itemID="{CCF4E3F6-9BF7-46CA-9914-9B06D7061733}">
   <ds:schemaRefs>
     <ds:schemaRef ds:uri="http://schemas.microsoft.com/office/2006/metadata/contentType"/>
@@ -40566,6 +40938,30 @@
 </ds:datastoreItem>
 </file>
 
+<file path=customXml/itemProps2.xml><?xml version="1.0" encoding="utf-8"?>
+<ds:datastoreItem xmlns:ds="http://schemas.openxmlformats.org/officeDocument/2006/customXml" ds:itemID="{4EA99AB7-52EE-4481-83AE-126E216AE03B}">
+  <ds:schemaRefs>
+    <ds:schemaRef ds:uri="http://schemas.microsoft.com/sharepoint/v3/contenttype/forms"/>
+  </ds:schemaRefs>
+</ds:datastoreItem>
+</file>
+
+<file path=customXml/itemProps3.xml><?xml version="1.0" encoding="utf-8"?>
+<ds:datastoreItem xmlns:ds="http://schemas.openxmlformats.org/officeDocument/2006/customXml" ds:itemID="{A9BC35ED-4834-4120-9B6C-94C253E3F331}">
+  <ds:schemaRefs>
+    <ds:schemaRef ds:uri="fed61328-d0c3-4d79-b5dd-5b1944323ceb"/>
+    <ds:schemaRef ds:uri="http://schemas.microsoft.com/office/2006/documentManagement/types"/>
+    <ds:schemaRef ds:uri="http://purl.org/dc/elements/1.1/"/>
+    <ds:schemaRef ds:uri="http://purl.org/dc/terms/"/>
+    <ds:schemaRef ds:uri="http://purl.org/dc/dcmitype/"/>
+    <ds:schemaRef ds:uri="http://schemas.microsoft.com/office/infopath/2007/PartnerControls"/>
+    <ds:schemaRef ds:uri="http://schemas.openxmlformats.org/package/2006/metadata/core-properties"/>
+    <ds:schemaRef ds:uri="http://schemas.microsoft.com/office/2006/metadata/properties"/>
+    <ds:schemaRef ds:uri="http://www.w3.org/XML/1998/namespace"/>
+  </ds:schemaRefs>
+</ds:datastoreItem>
+</file>
+
 <file path=customXml/itemProps4.xml><?xml version="1.0" encoding="utf-8"?>
 <ds:datastoreItem xmlns:ds="http://schemas.openxmlformats.org/officeDocument/2006/customXml" ds:itemID="{C244AD68-00C0-4A90-A81C-CA8116C8DA0A}">
   <ds:schemaRefs>

</xml_diff>